<commit_message>
updates to SVM scripts and instructions on multivariate analysis process included in README.md
</commit_message>
<xml_diff>
--- a/current_results.pptx
+++ b/current_results.pptx
@@ -556,6 +556,90 @@
     <p:extLst>
       <p:ext uri="{BB962C8B-B14F-4D97-AF65-F5344CB8AC3E}">
         <p14:creationId xmlns:p14="http://schemas.microsoft.com/office/powerpoint/2010/main" val="3576768624"/>
+      </p:ext>
+    </p:extLst>
+  </p:cSld>
+  <p:clrMapOvr>
+    <a:masterClrMapping/>
+  </p:clrMapOvr>
+</p:notes>
+</file>
+
+<file path=ppt/notesSlides/notesSlide2.xml><?xml version="1.0" encoding="utf-8"?>
+<p:notes xmlns:a="http://schemas.openxmlformats.org/drawingml/2006/main" xmlns:r="http://schemas.openxmlformats.org/officeDocument/2006/relationships" xmlns:p="http://schemas.openxmlformats.org/presentationml/2006/main">
+  <p:cSld>
+    <p:spTree>
+      <p:nvGrpSpPr>
+        <p:cNvPr id="1" name=""/>
+        <p:cNvGrpSpPr/>
+        <p:nvPr/>
+      </p:nvGrpSpPr>
+      <p:grpSpPr>
+        <a:xfrm>
+          <a:off x="0" y="0"/>
+          <a:ext cx="0" cy="0"/>
+          <a:chOff x="0" y="0"/>
+          <a:chExt cx="0" cy="0"/>
+        </a:xfrm>
+      </p:grpSpPr>
+      <p:sp>
+        <p:nvSpPr>
+          <p:cNvPr id="2" name="Slide Image Placeholder 1"/>
+          <p:cNvSpPr>
+            <a:spLocks noGrp="1" noRot="1" noChangeAspect="1"/>
+          </p:cNvSpPr>
+          <p:nvPr>
+            <p:ph type="sldImg"/>
+          </p:nvPr>
+        </p:nvSpPr>
+        <p:spPr/>
+      </p:sp>
+      <p:sp>
+        <p:nvSpPr>
+          <p:cNvPr id="3" name="Notes Placeholder 2"/>
+          <p:cNvSpPr>
+            <a:spLocks noGrp="1"/>
+          </p:cNvSpPr>
+          <p:nvPr>
+            <p:ph type="body" idx="1"/>
+          </p:nvPr>
+        </p:nvSpPr>
+        <p:spPr/>
+        <p:txBody>
+          <a:bodyPr/>
+          <a:lstStyle/>
+          <a:p>
+            <a:endParaRPr lang="en-US" dirty="0"/>
+          </a:p>
+        </p:txBody>
+      </p:sp>
+      <p:sp>
+        <p:nvSpPr>
+          <p:cNvPr id="4" name="Slide Number Placeholder 3"/>
+          <p:cNvSpPr>
+            <a:spLocks noGrp="1"/>
+          </p:cNvSpPr>
+          <p:nvPr>
+            <p:ph type="sldNum" sz="quarter" idx="5"/>
+          </p:nvPr>
+        </p:nvSpPr>
+        <p:spPr/>
+        <p:txBody>
+          <a:bodyPr/>
+          <a:lstStyle/>
+          <a:p>
+            <a:fld id="{BD51AA21-97C2-AD47-9135-5F638764796F}" type="slidenum">
+              <a:rPr lang="en-US" smtClean="0"/>
+              <a:t>4</a:t>
+            </a:fld>
+            <a:endParaRPr lang="en-US"/>
+          </a:p>
+        </p:txBody>
+      </p:sp>
+    </p:spTree>
+    <p:extLst>
+      <p:ext uri="{BB962C8B-B14F-4D97-AF65-F5344CB8AC3E}">
+        <p14:creationId xmlns:p14="http://schemas.microsoft.com/office/powerpoint/2010/main" val="1134080473"/>
       </p:ext>
     </p:extLst>
   </p:cSld>
@@ -4315,7 +4399,7 @@
           <p:nvPr/>
         </p:nvPicPr>
         <p:blipFill>
-          <a:blip r:embed="rId2"/>
+          <a:blip r:embed="rId3"/>
           <a:stretch>
             <a:fillRect/>
           </a:stretch>
@@ -4345,7 +4429,7 @@
           <p:nvPr/>
         </p:nvPicPr>
         <p:blipFill>
-          <a:blip r:embed="rId3"/>
+          <a:blip r:embed="rId4"/>
           <a:stretch>
             <a:fillRect/>
           </a:stretch>

</xml_diff>

<commit_message>
new scripts for multivariate analysis and updated results
</commit_message>
<xml_diff>
--- a/current_results.pptx
+++ b/current_results.pptx
@@ -5,13 +5,15 @@
     <p:sldMasterId id="2147483648" r:id="rId1"/>
   </p:sldMasterIdLst>
   <p:notesMasterIdLst>
-    <p:notesMasterId r:id="rId6"/>
+    <p:notesMasterId r:id="rId8"/>
   </p:notesMasterIdLst>
   <p:sldIdLst>
     <p:sldId id="256" r:id="rId2"/>
     <p:sldId id="257" r:id="rId3"/>
     <p:sldId id="258" r:id="rId4"/>
     <p:sldId id="259" r:id="rId5"/>
+    <p:sldId id="260" r:id="rId6"/>
+    <p:sldId id="261" r:id="rId7"/>
   </p:sldIdLst>
   <p:sldSz cx="12192000" cy="6858000"/>
   <p:notesSz cx="6858000" cy="9144000"/>
@@ -110,6 +112,11 @@
       </a:defRPr>
     </a:lvl9pPr>
   </p:defaultTextStyle>
+  <p:extLst>
+    <p:ext uri="{EFAFB233-063F-42B5-8137-9DF3F51BA10A}">
+      <p15:sldGuideLst xmlns:p15="http://schemas.microsoft.com/office/powerpoint/2012/main"/>
+    </p:ext>
+  </p:extLst>
 </p:presentation>
 </file>
 
@@ -195,7 +202,7 @@
           <a:p>
             <a:fld id="{D79102DD-FFB2-8A47-9C5D-27C8F80A3D56}" type="datetimeFigureOut">
               <a:rPr lang="en-US" smtClean="0"/>
-              <a:t>4/22/24</a:t>
+              <a:t>6/4/24</a:t>
             </a:fld>
             <a:endParaRPr lang="en-US"/>
           </a:p>
@@ -649,6 +656,104 @@
 </p:notes>
 </file>
 
+<file path=ppt/notesSlides/notesSlide3.xml><?xml version="1.0" encoding="utf-8"?>
+<p:notes xmlns:a="http://schemas.openxmlformats.org/drawingml/2006/main" xmlns:r="http://schemas.openxmlformats.org/officeDocument/2006/relationships" xmlns:p="http://schemas.openxmlformats.org/presentationml/2006/main">
+  <p:cSld>
+    <p:spTree>
+      <p:nvGrpSpPr>
+        <p:cNvPr id="1" name=""/>
+        <p:cNvGrpSpPr/>
+        <p:nvPr/>
+      </p:nvGrpSpPr>
+      <p:grpSpPr>
+        <a:xfrm>
+          <a:off x="0" y="0"/>
+          <a:ext cx="0" cy="0"/>
+          <a:chOff x="0" y="0"/>
+          <a:chExt cx="0" cy="0"/>
+        </a:xfrm>
+      </p:grpSpPr>
+      <p:sp>
+        <p:nvSpPr>
+          <p:cNvPr id="2" name="Slide Image Placeholder 1"/>
+          <p:cNvSpPr>
+            <a:spLocks noGrp="1" noRot="1" noChangeAspect="1"/>
+          </p:cNvSpPr>
+          <p:nvPr>
+            <p:ph type="sldImg"/>
+          </p:nvPr>
+        </p:nvSpPr>
+        <p:spPr/>
+      </p:sp>
+      <p:sp>
+        <p:nvSpPr>
+          <p:cNvPr id="3" name="Notes Placeholder 2"/>
+          <p:cNvSpPr>
+            <a:spLocks noGrp="1"/>
+          </p:cNvSpPr>
+          <p:nvPr>
+            <p:ph type="body" idx="1"/>
+          </p:nvPr>
+        </p:nvSpPr>
+        <p:spPr/>
+        <p:txBody>
+          <a:bodyPr/>
+          <a:lstStyle/>
+          <a:p>
+            <a:r>
+              <a:rPr lang="en-US" dirty="0"/>
+              <a:t>,</a:t>
+            </a:r>
+            <a:r>
+              <a:rPr lang="en-US" dirty="0" err="1"/>
+              <a:t>discovery_avg_accuracy,replication_avg_accuracy</a:t>
+            </a:r>
+            <a:endParaRPr lang="en-US" dirty="0"/>
+          </a:p>
+          <a:p>
+            <a:r>
+              <a:rPr lang="en-US" dirty="0"/>
+              <a:t>0,0.9224506172839506,0.9190487366556538</a:t>
+            </a:r>
+          </a:p>
+        </p:txBody>
+      </p:sp>
+      <p:sp>
+        <p:nvSpPr>
+          <p:cNvPr id="4" name="Slide Number Placeholder 3"/>
+          <p:cNvSpPr>
+            <a:spLocks noGrp="1"/>
+          </p:cNvSpPr>
+          <p:nvPr>
+            <p:ph type="sldNum" sz="quarter" idx="5"/>
+          </p:nvPr>
+        </p:nvSpPr>
+        <p:spPr/>
+        <p:txBody>
+          <a:bodyPr/>
+          <a:lstStyle/>
+          <a:p>
+            <a:fld id="{BD51AA21-97C2-AD47-9135-5F638764796F}" type="slidenum">
+              <a:rPr lang="en-US" smtClean="0"/>
+              <a:t>5</a:t>
+            </a:fld>
+            <a:endParaRPr lang="en-US"/>
+          </a:p>
+        </p:txBody>
+      </p:sp>
+    </p:spTree>
+    <p:extLst>
+      <p:ext uri="{BB962C8B-B14F-4D97-AF65-F5344CB8AC3E}">
+        <p14:creationId xmlns:p14="http://schemas.microsoft.com/office/powerpoint/2010/main" val="852580814"/>
+      </p:ext>
+    </p:extLst>
+  </p:cSld>
+  <p:clrMapOvr>
+    <a:masterClrMapping/>
+  </p:clrMapOvr>
+</p:notes>
+</file>
+
 <file path=ppt/slideLayouts/slideLayout1.xml><?xml version="1.0" encoding="utf-8"?>
 <p:sldLayout xmlns:a="http://schemas.openxmlformats.org/drawingml/2006/main" xmlns:r="http://schemas.openxmlformats.org/officeDocument/2006/relationships" xmlns:p="http://schemas.openxmlformats.org/presentationml/2006/main" type="title" preserve="1">
   <p:cSld name="Title Slide">
@@ -796,7 +901,7 @@
           <a:p>
             <a:fld id="{23A8B8CD-2E35-3C4D-8188-9947A9A86DD3}" type="datetimeFigureOut">
               <a:rPr lang="en-US" smtClean="0"/>
-              <a:t>4/22/24</a:t>
+              <a:t>6/4/24</a:t>
             </a:fld>
             <a:endParaRPr lang="en-US"/>
           </a:p>
@@ -994,7 +1099,7 @@
           <a:p>
             <a:fld id="{23A8B8CD-2E35-3C4D-8188-9947A9A86DD3}" type="datetimeFigureOut">
               <a:rPr lang="en-US" smtClean="0"/>
-              <a:t>4/22/24</a:t>
+              <a:t>6/4/24</a:t>
             </a:fld>
             <a:endParaRPr lang="en-US"/>
           </a:p>
@@ -1202,7 +1307,7 @@
           <a:p>
             <a:fld id="{23A8B8CD-2E35-3C4D-8188-9947A9A86DD3}" type="datetimeFigureOut">
               <a:rPr lang="en-US" smtClean="0"/>
-              <a:t>4/22/24</a:t>
+              <a:t>6/4/24</a:t>
             </a:fld>
             <a:endParaRPr lang="en-US"/>
           </a:p>
@@ -1400,7 +1505,7 @@
           <a:p>
             <a:fld id="{23A8B8CD-2E35-3C4D-8188-9947A9A86DD3}" type="datetimeFigureOut">
               <a:rPr lang="en-US" smtClean="0"/>
-              <a:t>4/22/24</a:t>
+              <a:t>6/4/24</a:t>
             </a:fld>
             <a:endParaRPr lang="en-US"/>
           </a:p>
@@ -1675,7 +1780,7 @@
           <a:p>
             <a:fld id="{23A8B8CD-2E35-3C4D-8188-9947A9A86DD3}" type="datetimeFigureOut">
               <a:rPr lang="en-US" smtClean="0"/>
-              <a:t>4/22/24</a:t>
+              <a:t>6/4/24</a:t>
             </a:fld>
             <a:endParaRPr lang="en-US"/>
           </a:p>
@@ -1940,7 +2045,7 @@
           <a:p>
             <a:fld id="{23A8B8CD-2E35-3C4D-8188-9947A9A86DD3}" type="datetimeFigureOut">
               <a:rPr lang="en-US" smtClean="0"/>
-              <a:t>4/22/24</a:t>
+              <a:t>6/4/24</a:t>
             </a:fld>
             <a:endParaRPr lang="en-US"/>
           </a:p>
@@ -2352,7 +2457,7 @@
           <a:p>
             <a:fld id="{23A8B8CD-2E35-3C4D-8188-9947A9A86DD3}" type="datetimeFigureOut">
               <a:rPr lang="en-US" smtClean="0"/>
-              <a:t>4/22/24</a:t>
+              <a:t>6/4/24</a:t>
             </a:fld>
             <a:endParaRPr lang="en-US"/>
           </a:p>
@@ -2493,7 +2598,7 @@
           <a:p>
             <a:fld id="{23A8B8CD-2E35-3C4D-8188-9947A9A86DD3}" type="datetimeFigureOut">
               <a:rPr lang="en-US" smtClean="0"/>
-              <a:t>4/22/24</a:t>
+              <a:t>6/4/24</a:t>
             </a:fld>
             <a:endParaRPr lang="en-US"/>
           </a:p>
@@ -2606,7 +2711,7 @@
           <a:p>
             <a:fld id="{23A8B8CD-2E35-3C4D-8188-9947A9A86DD3}" type="datetimeFigureOut">
               <a:rPr lang="en-US" smtClean="0"/>
-              <a:t>4/22/24</a:t>
+              <a:t>6/4/24</a:t>
             </a:fld>
             <a:endParaRPr lang="en-US"/>
           </a:p>
@@ -2917,7 +3022,7 @@
           <a:p>
             <a:fld id="{23A8B8CD-2E35-3C4D-8188-9947A9A86DD3}" type="datetimeFigureOut">
               <a:rPr lang="en-US" smtClean="0"/>
-              <a:t>4/22/24</a:t>
+              <a:t>6/4/24</a:t>
             </a:fld>
             <a:endParaRPr lang="en-US"/>
           </a:p>
@@ -3205,7 +3310,7 @@
           <a:p>
             <a:fld id="{23A8B8CD-2E35-3C4D-8188-9947A9A86DD3}" type="datetimeFigureOut">
               <a:rPr lang="en-US" smtClean="0"/>
-              <a:t>4/22/24</a:t>
+              <a:t>6/4/24</a:t>
             </a:fld>
             <a:endParaRPr lang="en-US"/>
           </a:p>
@@ -3446,7 +3551,7 @@
           <a:p>
             <a:fld id="{23A8B8CD-2E35-3C4D-8188-9947A9A86DD3}" type="datetimeFigureOut">
               <a:rPr lang="en-US" smtClean="0"/>
-              <a:t>4/22/24</a:t>
+              <a:t>6/4/24</a:t>
             </a:fld>
             <a:endParaRPr lang="en-US"/>
           </a:p>
@@ -4328,7 +4433,7 @@
           <a:p>
             <a:r>
               <a:rPr lang="en-US" dirty="0"/>
-              <a:t>Multivariate analysis: non </a:t>
+              <a:t>Multivariate analysis: </a:t>
             </a:r>
             <a:r>
               <a:rPr lang="en-US" dirty="0" err="1"/>
@@ -4344,7 +4449,7 @@
             </a:r>
             <a:r>
               <a:rPr lang="en-US" dirty="0"/>
-              <a:t> one iteration</a:t>
+              <a:t> 100 iterations</a:t>
             </a:r>
           </a:p>
         </p:txBody>
@@ -4384,12 +4489,47 @@
           </a:p>
         </p:txBody>
       </p:sp>
+      <p:sp>
+        <p:nvSpPr>
+          <p:cNvPr id="8" name="TextBox 7">
+            <a:extLst>
+              <a:ext uri="{FF2B5EF4-FFF2-40B4-BE49-F238E27FC236}">
+                <a16:creationId xmlns:a16="http://schemas.microsoft.com/office/drawing/2014/main" id="{DD648C4A-9CCA-D65B-C4D0-69DAFBF49EB4}"/>
+              </a:ext>
+            </a:extLst>
+          </p:cNvPr>
+          <p:cNvSpPr txBox="1"/>
+          <p:nvPr/>
+        </p:nvSpPr>
+        <p:spPr>
+          <a:xfrm>
+            <a:off x="2504661" y="1615172"/>
+            <a:ext cx="1520544" cy="369332"/>
+          </a:xfrm>
+          <a:prstGeom prst="rect">
+            <a:avLst/>
+          </a:prstGeom>
+          <a:noFill/>
+        </p:spPr>
+        <p:txBody>
+          <a:bodyPr wrap="none" rtlCol="0">
+            <a:spAutoFit/>
+          </a:bodyPr>
+          <a:lstStyle/>
+          <a:p>
+            <a:r>
+              <a:rPr lang="en-US" dirty="0"/>
+              <a:t>Discovery set</a:t>
+            </a:r>
+          </a:p>
+        </p:txBody>
+      </p:sp>
       <p:pic>
         <p:nvPicPr>
-          <p:cNvPr id="6" name="Picture 5">
-            <a:extLst>
-              <a:ext uri="{FF2B5EF4-FFF2-40B4-BE49-F238E27FC236}">
-                <a16:creationId xmlns:a16="http://schemas.microsoft.com/office/drawing/2014/main" id="{9D3373F9-48CC-4923-1E41-A59E46AA9889}"/>
+          <p:cNvPr id="9" name="Picture 8">
+            <a:extLst>
+              <a:ext uri="{FF2B5EF4-FFF2-40B4-BE49-F238E27FC236}">
+                <a16:creationId xmlns:a16="http://schemas.microsoft.com/office/drawing/2014/main" id="{CA0A80E1-2C88-BFD5-0B95-E8FEE4940B28}"/>
               </a:ext>
             </a:extLst>
           </p:cNvPr>
@@ -4406,8 +4546,8 @@
         </p:blipFill>
         <p:spPr>
           <a:xfrm>
-            <a:off x="5831510" y="1875354"/>
-            <a:ext cx="5747578" cy="4783527"/>
+            <a:off x="377880" y="1984504"/>
+            <a:ext cx="5718120" cy="4759010"/>
           </a:xfrm>
           <a:prstGeom prst="rect">
             <a:avLst/>
@@ -4416,10 +4556,10 @@
       </p:pic>
       <p:pic>
         <p:nvPicPr>
-          <p:cNvPr id="7" name="Picture 6">
-            <a:extLst>
-              <a:ext uri="{FF2B5EF4-FFF2-40B4-BE49-F238E27FC236}">
-                <a16:creationId xmlns:a16="http://schemas.microsoft.com/office/drawing/2014/main" id="{214AEEC2-3FDB-0BE7-3A3E-2C703B122CCD}"/>
+          <p:cNvPr id="10" name="Picture 9">
+            <a:extLst>
+              <a:ext uri="{FF2B5EF4-FFF2-40B4-BE49-F238E27FC236}">
+                <a16:creationId xmlns:a16="http://schemas.microsoft.com/office/drawing/2014/main" id="{C9FE4079-4E85-EF4F-7F74-7403E03B1E1F}"/>
               </a:ext>
             </a:extLst>
           </p:cNvPr>
@@ -4436,20 +4576,201 @@
         </p:blipFill>
         <p:spPr>
           <a:xfrm>
-            <a:off x="212587" y="1984250"/>
-            <a:ext cx="5417274" cy="4508625"/>
+            <a:off x="6003130" y="1875354"/>
+            <a:ext cx="6000374" cy="4993921"/>
           </a:xfrm>
           <a:prstGeom prst="rect">
             <a:avLst/>
           </a:prstGeom>
         </p:spPr>
       </p:pic>
-      <p:sp>
-        <p:nvSpPr>
-          <p:cNvPr id="8" name="TextBox 7">
-            <a:extLst>
-              <a:ext uri="{FF2B5EF4-FFF2-40B4-BE49-F238E27FC236}">
-                <a16:creationId xmlns:a16="http://schemas.microsoft.com/office/drawing/2014/main" id="{DD648C4A-9CCA-D65B-C4D0-69DAFBF49EB4}"/>
+    </p:spTree>
+    <p:extLst>
+      <p:ext uri="{BB962C8B-B14F-4D97-AF65-F5344CB8AC3E}">
+        <p14:creationId xmlns:p14="http://schemas.microsoft.com/office/powerpoint/2010/main" val="475439366"/>
+      </p:ext>
+    </p:extLst>
+  </p:cSld>
+  <p:clrMapOvr>
+    <a:masterClrMapping/>
+  </p:clrMapOvr>
+</p:sld>
+</file>
+
+<file path=ppt/slides/slide5.xml><?xml version="1.0" encoding="utf-8"?>
+<p:sld xmlns:a="http://schemas.openxmlformats.org/drawingml/2006/main" xmlns:r="http://schemas.openxmlformats.org/officeDocument/2006/relationships" xmlns:p="http://schemas.openxmlformats.org/presentationml/2006/main">
+  <p:cSld>
+    <p:spTree>
+      <p:nvGrpSpPr>
+        <p:cNvPr id="1" name=""/>
+        <p:cNvGrpSpPr/>
+        <p:nvPr/>
+      </p:nvGrpSpPr>
+      <p:grpSpPr>
+        <a:xfrm>
+          <a:off x="0" y="0"/>
+          <a:ext cx="0" cy="0"/>
+          <a:chOff x="0" y="0"/>
+          <a:chExt cx="0" cy="0"/>
+        </a:xfrm>
+      </p:grpSpPr>
+      <p:sp>
+        <p:nvSpPr>
+          <p:cNvPr id="2" name="Title 1">
+            <a:extLst>
+              <a:ext uri="{FF2B5EF4-FFF2-40B4-BE49-F238E27FC236}">
+                <a16:creationId xmlns:a16="http://schemas.microsoft.com/office/drawing/2014/main" id="{E28DDBFE-F24E-D710-5ED7-DD9C98E5A59F}"/>
+              </a:ext>
+            </a:extLst>
+          </p:cNvPr>
+          <p:cNvSpPr>
+            <a:spLocks noGrp="1"/>
+          </p:cNvSpPr>
+          <p:nvPr>
+            <p:ph type="title"/>
+          </p:nvPr>
+        </p:nvSpPr>
+        <p:spPr/>
+        <p:txBody>
+          <a:bodyPr/>
+          <a:lstStyle/>
+          <a:p>
+            <a:r>
+              <a:rPr lang="en-US" dirty="0"/>
+              <a:t>1000 run accuracy histograms</a:t>
+            </a:r>
+          </a:p>
+        </p:txBody>
+      </p:sp>
+      <p:pic>
+        <p:nvPicPr>
+          <p:cNvPr id="5" name="Picture 4">
+            <a:extLst>
+              <a:ext uri="{FF2B5EF4-FFF2-40B4-BE49-F238E27FC236}">
+                <a16:creationId xmlns:a16="http://schemas.microsoft.com/office/drawing/2014/main" id="{2A6A5024-32A6-8FD5-9F2D-2C3F85328724}"/>
+              </a:ext>
+            </a:extLst>
+          </p:cNvPr>
+          <p:cNvPicPr>
+            <a:picLocks noChangeAspect="1"/>
+          </p:cNvPicPr>
+          <p:nvPr/>
+        </p:nvPicPr>
+        <p:blipFill>
+          <a:blip r:embed="rId3"/>
+          <a:stretch>
+            <a:fillRect/>
+          </a:stretch>
+        </p:blipFill>
+        <p:spPr>
+          <a:xfrm>
+            <a:off x="927988" y="1877337"/>
+            <a:ext cx="5168012" cy="4837788"/>
+          </a:xfrm>
+          <a:prstGeom prst="rect">
+            <a:avLst/>
+          </a:prstGeom>
+        </p:spPr>
+      </p:pic>
+      <p:pic>
+        <p:nvPicPr>
+          <p:cNvPr id="6" name="Picture 5">
+            <a:extLst>
+              <a:ext uri="{FF2B5EF4-FFF2-40B4-BE49-F238E27FC236}">
+                <a16:creationId xmlns:a16="http://schemas.microsoft.com/office/drawing/2014/main" id="{8BD8C9D8-0848-F0C5-1C07-E55167445E18}"/>
+              </a:ext>
+            </a:extLst>
+          </p:cNvPr>
+          <p:cNvPicPr>
+            <a:picLocks noChangeAspect="1"/>
+          </p:cNvPicPr>
+          <p:nvPr/>
+        </p:nvPicPr>
+        <p:blipFill>
+          <a:blip r:embed="rId4"/>
+          <a:stretch>
+            <a:fillRect/>
+          </a:stretch>
+        </p:blipFill>
+        <p:spPr>
+          <a:xfrm>
+            <a:off x="6210300" y="1930835"/>
+            <a:ext cx="5053712" cy="4730791"/>
+          </a:xfrm>
+          <a:prstGeom prst="rect">
+            <a:avLst/>
+          </a:prstGeom>
+        </p:spPr>
+      </p:pic>
+    </p:spTree>
+    <p:extLst>
+      <p:ext uri="{BB962C8B-B14F-4D97-AF65-F5344CB8AC3E}">
+        <p14:creationId xmlns:p14="http://schemas.microsoft.com/office/powerpoint/2010/main" val="2692863096"/>
+      </p:ext>
+    </p:extLst>
+  </p:cSld>
+  <p:clrMapOvr>
+    <a:masterClrMapping/>
+  </p:clrMapOvr>
+</p:sld>
+</file>
+
+<file path=ppt/slides/slide6.xml><?xml version="1.0" encoding="utf-8"?>
+<p:sld xmlns:a="http://schemas.openxmlformats.org/drawingml/2006/main" xmlns:r="http://schemas.openxmlformats.org/officeDocument/2006/relationships" xmlns:p="http://schemas.openxmlformats.org/presentationml/2006/main">
+  <p:cSld>
+    <p:spTree>
+      <p:nvGrpSpPr>
+        <p:cNvPr id="1" name=""/>
+        <p:cNvGrpSpPr/>
+        <p:nvPr/>
+      </p:nvGrpSpPr>
+      <p:grpSpPr>
+        <a:xfrm>
+          <a:off x="0" y="0"/>
+          <a:ext cx="0" cy="0"/>
+          <a:chOff x="0" y="0"/>
+          <a:chExt cx="0" cy="0"/>
+        </a:xfrm>
+      </p:grpSpPr>
+      <p:sp>
+        <p:nvSpPr>
+          <p:cNvPr id="2" name="Title 1">
+            <a:extLst>
+              <a:ext uri="{FF2B5EF4-FFF2-40B4-BE49-F238E27FC236}">
+                <a16:creationId xmlns:a16="http://schemas.microsoft.com/office/drawing/2014/main" id="{9CD69A48-B0D1-E25C-D22B-25A6A187BECC}"/>
+              </a:ext>
+            </a:extLst>
+          </p:cNvPr>
+          <p:cNvSpPr>
+            <a:spLocks noGrp="1"/>
+          </p:cNvSpPr>
+          <p:nvPr>
+            <p:ph type="title"/>
+          </p:nvPr>
+        </p:nvSpPr>
+        <p:spPr>
+          <a:xfrm>
+            <a:off x="838200" y="-110237"/>
+            <a:ext cx="10515600" cy="1325563"/>
+          </a:xfrm>
+        </p:spPr>
+        <p:txBody>
+          <a:bodyPr/>
+          <a:lstStyle/>
+          <a:p>
+            <a:r>
+              <a:rPr lang="en-US" dirty="0"/>
+              <a:t>Absolute sum of weights brain map</a:t>
+            </a:r>
+          </a:p>
+        </p:txBody>
+      </p:sp>
+      <p:sp>
+        <p:nvSpPr>
+          <p:cNvPr id="5" name="TextBox 4">
+            <a:extLst>
+              <a:ext uri="{FF2B5EF4-FFF2-40B4-BE49-F238E27FC236}">
+                <a16:creationId xmlns:a16="http://schemas.microsoft.com/office/drawing/2014/main" id="{68A500C9-5ADB-AEA7-A2A0-9CE4915625BA}"/>
               </a:ext>
             </a:extLst>
           </p:cNvPr>
@@ -4458,7 +4779,7 @@
         </p:nvSpPr>
         <p:spPr>
           <a:xfrm>
-            <a:off x="2504661" y="1615172"/>
+            <a:off x="10186988" y="1928813"/>
             <a:ext cx="1520544" cy="369332"/>
           </a:xfrm>
           <a:prstGeom prst="rect">
@@ -4479,10 +4800,105 @@
           </a:p>
         </p:txBody>
       </p:sp>
+      <p:pic>
+        <p:nvPicPr>
+          <p:cNvPr id="7" name="Picture 6">
+            <a:extLst>
+              <a:ext uri="{FF2B5EF4-FFF2-40B4-BE49-F238E27FC236}">
+                <a16:creationId xmlns:a16="http://schemas.microsoft.com/office/drawing/2014/main" id="{2460F82B-6CD6-F2AD-EA65-1E2F8A1ED5BD}"/>
+              </a:ext>
+            </a:extLst>
+          </p:cNvPr>
+          <p:cNvPicPr>
+            <a:picLocks noChangeAspect="1"/>
+          </p:cNvPicPr>
+          <p:nvPr/>
+        </p:nvPicPr>
+        <p:blipFill>
+          <a:blip r:embed="rId2"/>
+          <a:stretch>
+            <a:fillRect/>
+          </a:stretch>
+        </p:blipFill>
+        <p:spPr>
+          <a:xfrm>
+            <a:off x="1866900" y="1040548"/>
+            <a:ext cx="7419975" cy="2888843"/>
+          </a:xfrm>
+          <a:prstGeom prst="rect">
+            <a:avLst/>
+          </a:prstGeom>
+        </p:spPr>
+      </p:pic>
+      <p:pic>
+        <p:nvPicPr>
+          <p:cNvPr id="8" name="Picture 7">
+            <a:extLst>
+              <a:ext uri="{FF2B5EF4-FFF2-40B4-BE49-F238E27FC236}">
+                <a16:creationId xmlns:a16="http://schemas.microsoft.com/office/drawing/2014/main" id="{C03EFEF1-51FB-22C4-7A7B-D31974DD0C09}"/>
+              </a:ext>
+            </a:extLst>
+          </p:cNvPr>
+          <p:cNvPicPr>
+            <a:picLocks noChangeAspect="1"/>
+          </p:cNvPicPr>
+          <p:nvPr/>
+        </p:nvPicPr>
+        <p:blipFill>
+          <a:blip r:embed="rId3"/>
+          <a:stretch>
+            <a:fillRect/>
+          </a:stretch>
+        </p:blipFill>
+        <p:spPr>
+          <a:xfrm>
+            <a:off x="1866900" y="3929391"/>
+            <a:ext cx="7419975" cy="2785008"/>
+          </a:xfrm>
+          <a:prstGeom prst="rect">
+            <a:avLst/>
+          </a:prstGeom>
+        </p:spPr>
+      </p:pic>
+      <p:sp>
+        <p:nvSpPr>
+          <p:cNvPr id="9" name="TextBox 8">
+            <a:extLst>
+              <a:ext uri="{FF2B5EF4-FFF2-40B4-BE49-F238E27FC236}">
+                <a16:creationId xmlns:a16="http://schemas.microsoft.com/office/drawing/2014/main" id="{FFE1EC7E-23A5-B31B-0FDE-26030764DFE5}"/>
+              </a:ext>
+            </a:extLst>
+          </p:cNvPr>
+          <p:cNvSpPr txBox="1"/>
+          <p:nvPr/>
+        </p:nvSpPr>
+        <p:spPr>
+          <a:xfrm>
+            <a:off x="10158413" y="5157788"/>
+            <a:ext cx="1670457" cy="369332"/>
+          </a:xfrm>
+          <a:prstGeom prst="rect">
+            <a:avLst/>
+          </a:prstGeom>
+          <a:noFill/>
+        </p:spPr>
+        <p:txBody>
+          <a:bodyPr wrap="none" rtlCol="0">
+            <a:spAutoFit/>
+          </a:bodyPr>
+          <a:lstStyle/>
+          <a:p>
+            <a:r>
+              <a:rPr lang="en-US" dirty="0"/>
+              <a:t>Replication set</a:t>
+            </a:r>
+          </a:p>
+        </p:txBody>
+      </p:sp>
     </p:spTree>
     <p:extLst>
       <p:ext uri="{BB962C8B-B14F-4D97-AF65-F5344CB8AC3E}">
-        <p14:creationId xmlns:p14="http://schemas.microsoft.com/office/powerpoint/2010/main" val="475439366"/>
+        <p14:creationId xmlns:p14="http://schemas.microsoft.com/office/powerpoint/2010/main" val="2674635872"/>
       </p:ext>
     </p:extLst>
   </p:cSld>

</xml_diff>